<commit_message>
Added some slides, high level process flow (if we want to look at it), and info from resource.
</commit_message>
<xml_diff>
--- a/SickCoin.pptx
+++ b/SickCoin.pptx
@@ -9,8 +9,13 @@
     <p:sldId id="257" r:id="rId3"/>
     <p:sldId id="258" r:id="rId4"/>
     <p:sldId id="259" r:id="rId5"/>
-    <p:sldId id="260" r:id="rId6"/>
-    <p:sldId id="261" r:id="rId7"/>
+    <p:sldId id="262" r:id="rId6"/>
+    <p:sldId id="263" r:id="rId7"/>
+    <p:sldId id="266" r:id="rId8"/>
+    <p:sldId id="264" r:id="rId9"/>
+    <p:sldId id="260" r:id="rId10"/>
+    <p:sldId id="261" r:id="rId11"/>
+    <p:sldId id="265" r:id="rId12"/>
   </p:sldIdLst>
   <p:sldSz cx="12192000" cy="6858000"/>
   <p:notesSz cx="6858000" cy="9144000"/>
@@ -109,6 +114,11 @@
       </a:defRPr>
     </a:lvl9pPr>
   </p:defaultTextStyle>
+  <p:extLst>
+    <p:ext uri="{EFAFB233-063F-42B5-8137-9DF3F51BA10A}">
+      <p15:sldGuideLst xmlns:p15="http://schemas.microsoft.com/office/powerpoint/2012/main"/>
+    </p:ext>
+  </p:extLst>
 </p:presentation>
 </file>
 
@@ -259,7 +269,7 @@
           <a:p>
             <a:fld id="{F497B0DF-4F3C-4470-9671-189B5C6F9F30}" type="datetimeFigureOut">
               <a:rPr lang="en-US" smtClean="0"/>
-              <a:t>5/12/2020</a:t>
+              <a:t>5/14/2020</a:t>
             </a:fld>
             <a:endParaRPr lang="en-US"/>
           </a:p>
@@ -457,7 +467,7 @@
           <a:p>
             <a:fld id="{F497B0DF-4F3C-4470-9671-189B5C6F9F30}" type="datetimeFigureOut">
               <a:rPr lang="en-US" smtClean="0"/>
-              <a:t>5/12/2020</a:t>
+              <a:t>5/14/2020</a:t>
             </a:fld>
             <a:endParaRPr lang="en-US"/>
           </a:p>
@@ -665,7 +675,7 @@
           <a:p>
             <a:fld id="{F497B0DF-4F3C-4470-9671-189B5C6F9F30}" type="datetimeFigureOut">
               <a:rPr lang="en-US" smtClean="0"/>
-              <a:t>5/12/2020</a:t>
+              <a:t>5/14/2020</a:t>
             </a:fld>
             <a:endParaRPr lang="en-US"/>
           </a:p>
@@ -863,7 +873,7 @@
           <a:p>
             <a:fld id="{F497B0DF-4F3C-4470-9671-189B5C6F9F30}" type="datetimeFigureOut">
               <a:rPr lang="en-US" smtClean="0"/>
-              <a:t>5/12/2020</a:t>
+              <a:t>5/14/2020</a:t>
             </a:fld>
             <a:endParaRPr lang="en-US"/>
           </a:p>
@@ -1138,7 +1148,7 @@
           <a:p>
             <a:fld id="{F497B0DF-4F3C-4470-9671-189B5C6F9F30}" type="datetimeFigureOut">
               <a:rPr lang="en-US" smtClean="0"/>
-              <a:t>5/12/2020</a:t>
+              <a:t>5/14/2020</a:t>
             </a:fld>
             <a:endParaRPr lang="en-US"/>
           </a:p>
@@ -1403,7 +1413,7 @@
           <a:p>
             <a:fld id="{F497B0DF-4F3C-4470-9671-189B5C6F9F30}" type="datetimeFigureOut">
               <a:rPr lang="en-US" smtClean="0"/>
-              <a:t>5/12/2020</a:t>
+              <a:t>5/14/2020</a:t>
             </a:fld>
             <a:endParaRPr lang="en-US"/>
           </a:p>
@@ -1815,7 +1825,7 @@
           <a:p>
             <a:fld id="{F497B0DF-4F3C-4470-9671-189B5C6F9F30}" type="datetimeFigureOut">
               <a:rPr lang="en-US" smtClean="0"/>
-              <a:t>5/12/2020</a:t>
+              <a:t>5/14/2020</a:t>
             </a:fld>
             <a:endParaRPr lang="en-US"/>
           </a:p>
@@ -1956,7 +1966,7 @@
           <a:p>
             <a:fld id="{F497B0DF-4F3C-4470-9671-189B5C6F9F30}" type="datetimeFigureOut">
               <a:rPr lang="en-US" smtClean="0"/>
-              <a:t>5/12/2020</a:t>
+              <a:t>5/14/2020</a:t>
             </a:fld>
             <a:endParaRPr lang="en-US"/>
           </a:p>
@@ -2069,7 +2079,7 @@
           <a:p>
             <a:fld id="{F497B0DF-4F3C-4470-9671-189B5C6F9F30}" type="datetimeFigureOut">
               <a:rPr lang="en-US" smtClean="0"/>
-              <a:t>5/12/2020</a:t>
+              <a:t>5/14/2020</a:t>
             </a:fld>
             <a:endParaRPr lang="en-US"/>
           </a:p>
@@ -2380,7 +2390,7 @@
           <a:p>
             <a:fld id="{F497B0DF-4F3C-4470-9671-189B5C6F9F30}" type="datetimeFigureOut">
               <a:rPr lang="en-US" smtClean="0"/>
-              <a:t>5/12/2020</a:t>
+              <a:t>5/14/2020</a:t>
             </a:fld>
             <a:endParaRPr lang="en-US"/>
           </a:p>
@@ -2668,7 +2678,7 @@
           <a:p>
             <a:fld id="{F497B0DF-4F3C-4470-9671-189B5C6F9F30}" type="datetimeFigureOut">
               <a:rPr lang="en-US" smtClean="0"/>
-              <a:t>5/12/2020</a:t>
+              <a:t>5/14/2020</a:t>
             </a:fld>
             <a:endParaRPr lang="en-US"/>
           </a:p>
@@ -2909,7 +2919,7 @@
           <a:p>
             <a:fld id="{F497B0DF-4F3C-4470-9671-189B5C6F9F30}" type="datetimeFigureOut">
               <a:rPr lang="en-US" smtClean="0"/>
-              <a:t>5/12/2020</a:t>
+              <a:t>5/14/2020</a:t>
             </a:fld>
             <a:endParaRPr lang="en-US"/>
           </a:p>
@@ -3410,6 +3420,198 @@
 </p:sld>
 </file>
 
+<file path=ppt/slides/slide10.xml><?xml version="1.0" encoding="utf-8"?>
+<p:sld xmlns:a="http://schemas.openxmlformats.org/drawingml/2006/main" xmlns:r="http://schemas.openxmlformats.org/officeDocument/2006/relationships" xmlns:p="http://schemas.openxmlformats.org/presentationml/2006/main">
+  <p:cSld>
+    <p:spTree>
+      <p:nvGrpSpPr>
+        <p:cNvPr id="1" name=""/>
+        <p:cNvGrpSpPr/>
+        <p:nvPr/>
+      </p:nvGrpSpPr>
+      <p:grpSpPr>
+        <a:xfrm>
+          <a:off x="0" y="0"/>
+          <a:ext cx="0" cy="0"/>
+          <a:chOff x="0" y="0"/>
+          <a:chExt cx="0" cy="0"/>
+        </a:xfrm>
+      </p:grpSpPr>
+      <p:sp>
+        <p:nvSpPr>
+          <p:cNvPr id="2" name="Title 1">
+            <a:extLst>
+              <a:ext uri="{FF2B5EF4-FFF2-40B4-BE49-F238E27FC236}">
+                <a16:creationId xmlns:a16="http://schemas.microsoft.com/office/drawing/2014/main" id="{350D1BA4-1331-455B-A254-C25113A03A4F}"/>
+              </a:ext>
+            </a:extLst>
+          </p:cNvPr>
+          <p:cNvSpPr>
+            <a:spLocks noGrp="1"/>
+          </p:cNvSpPr>
+          <p:nvPr>
+            <p:ph type="title"/>
+          </p:nvPr>
+        </p:nvSpPr>
+        <p:spPr/>
+        <p:txBody>
+          <a:bodyPr/>
+          <a:lstStyle/>
+          <a:p>
+            <a:r>
+              <a:rPr lang="en-US" dirty="0"/>
+              <a:t>Resources</a:t>
+            </a:r>
+          </a:p>
+        </p:txBody>
+      </p:sp>
+      <p:sp>
+        <p:nvSpPr>
+          <p:cNvPr id="3" name="Content Placeholder 2">
+            <a:extLst>
+              <a:ext uri="{FF2B5EF4-FFF2-40B4-BE49-F238E27FC236}">
+                <a16:creationId xmlns:a16="http://schemas.microsoft.com/office/drawing/2014/main" id="{A9C6D207-A76F-4340-BFAB-9D581380C0A6}"/>
+              </a:ext>
+            </a:extLst>
+          </p:cNvPr>
+          <p:cNvSpPr>
+            <a:spLocks noGrp="1"/>
+          </p:cNvSpPr>
+          <p:nvPr>
+            <p:ph idx="1"/>
+          </p:nvPr>
+        </p:nvSpPr>
+        <p:spPr/>
+        <p:txBody>
+          <a:bodyPr/>
+          <a:lstStyle/>
+          <a:p>
+            <a:r>
+              <a:rPr lang="en-US" dirty="0">
+                <a:hlinkClick r:id="rId2"/>
+              </a:rPr>
+              <a:t>https://medicalchain.com/Medicalchain-Whitepaper-EN.pdf</a:t>
+            </a:r>
+            <a:endParaRPr lang="en-US" dirty="0"/>
+          </a:p>
+        </p:txBody>
+      </p:sp>
+    </p:spTree>
+    <p:extLst>
+      <p:ext uri="{BB962C8B-B14F-4D97-AF65-F5344CB8AC3E}">
+        <p14:creationId xmlns:p14="http://schemas.microsoft.com/office/powerpoint/2010/main" val="538036556"/>
+      </p:ext>
+    </p:extLst>
+  </p:cSld>
+  <p:clrMapOvr>
+    <a:masterClrMapping/>
+  </p:clrMapOvr>
+</p:sld>
+</file>
+
+<file path=ppt/slides/slide11.xml><?xml version="1.0" encoding="utf-8"?>
+<p:sld xmlns:a="http://schemas.openxmlformats.org/drawingml/2006/main" xmlns:r="http://schemas.openxmlformats.org/officeDocument/2006/relationships" xmlns:p="http://schemas.openxmlformats.org/presentationml/2006/main">
+  <p:cSld>
+    <p:spTree>
+      <p:nvGrpSpPr>
+        <p:cNvPr id="1" name=""/>
+        <p:cNvGrpSpPr/>
+        <p:nvPr/>
+      </p:nvGrpSpPr>
+      <p:grpSpPr>
+        <a:xfrm>
+          <a:off x="0" y="0"/>
+          <a:ext cx="0" cy="0"/>
+          <a:chOff x="0" y="0"/>
+          <a:chExt cx="0" cy="0"/>
+        </a:xfrm>
+      </p:grpSpPr>
+      <p:sp>
+        <p:nvSpPr>
+          <p:cNvPr id="2" name="Title 1">
+            <a:extLst>
+              <a:ext uri="{FF2B5EF4-FFF2-40B4-BE49-F238E27FC236}">
+                <a16:creationId xmlns:a16="http://schemas.microsoft.com/office/drawing/2014/main" id="{F88B1BB0-F578-4A1D-964B-19BA074F65AC}"/>
+              </a:ext>
+            </a:extLst>
+          </p:cNvPr>
+          <p:cNvSpPr>
+            <a:spLocks noGrp="1"/>
+          </p:cNvSpPr>
+          <p:nvPr>
+            <p:ph type="title"/>
+          </p:nvPr>
+        </p:nvSpPr>
+        <p:spPr>
+          <a:xfrm>
+            <a:off x="-17477" y="157866"/>
+            <a:ext cx="4186806" cy="1325563"/>
+          </a:xfrm>
+        </p:spPr>
+        <p:txBody>
+          <a:bodyPr>
+            <a:normAutofit/>
+          </a:bodyPr>
+          <a:lstStyle/>
+          <a:p>
+            <a:r>
+              <a:rPr lang="en-US" sz="3200" dirty="0"/>
+              <a:t>From </a:t>
+            </a:r>
+            <a:r>
+              <a:rPr lang="en-US" sz="3200" dirty="0" err="1"/>
+              <a:t>medicalchain</a:t>
+            </a:r>
+            <a:r>
+              <a:rPr lang="en-US" sz="3200" dirty="0"/>
+              <a:t> whitepaper</a:t>
+            </a:r>
+          </a:p>
+        </p:txBody>
+      </p:sp>
+      <p:pic>
+        <p:nvPicPr>
+          <p:cNvPr id="4" name="Picture 3">
+            <a:extLst>
+              <a:ext uri="{FF2B5EF4-FFF2-40B4-BE49-F238E27FC236}">
+                <a16:creationId xmlns:a16="http://schemas.microsoft.com/office/drawing/2014/main" id="{EADA2CE6-46F9-412A-83C6-3A8111249256}"/>
+              </a:ext>
+            </a:extLst>
+          </p:cNvPr>
+          <p:cNvPicPr>
+            <a:picLocks noChangeAspect="1"/>
+          </p:cNvPicPr>
+          <p:nvPr/>
+        </p:nvPicPr>
+        <p:blipFill>
+          <a:blip r:embed="rId2"/>
+          <a:stretch>
+            <a:fillRect/>
+          </a:stretch>
+        </p:blipFill>
+        <p:spPr>
+          <a:xfrm>
+            <a:off x="3817814" y="365125"/>
+            <a:ext cx="8230749" cy="6335009"/>
+          </a:xfrm>
+          <a:prstGeom prst="rect">
+            <a:avLst/>
+          </a:prstGeom>
+        </p:spPr>
+      </p:pic>
+    </p:spTree>
+    <p:extLst>
+      <p:ext uri="{BB962C8B-B14F-4D97-AF65-F5344CB8AC3E}">
+        <p14:creationId xmlns:p14="http://schemas.microsoft.com/office/powerpoint/2010/main" val="3573763535"/>
+      </p:ext>
+    </p:extLst>
+  </p:cSld>
+  <p:clrMapOvr>
+    <a:masterClrMapping/>
+  </p:clrMapOvr>
+</p:sld>
+</file>
+
 <file path=ppt/slides/slide2.xml><?xml version="1.0" encoding="utf-8"?>
 <p:sld xmlns:a="http://schemas.openxmlformats.org/drawingml/2006/main" xmlns:r="http://schemas.openxmlformats.org/officeDocument/2006/relationships" xmlns:p="http://schemas.openxmlformats.org/presentationml/2006/main">
   <p:cSld>
@@ -3697,12 +3899,8 @@
           <a:lstStyle/>
           <a:p>
             <a:r>
-              <a:rPr lang="en-US" dirty="0" err="1"/>
-              <a:t>Patien</a:t>
-            </a:r>
-            <a:r>
               <a:rPr lang="en-US" dirty="0"/>
-              <a:t> has a collection of tokens based on their procedures and whatever</a:t>
+              <a:t>Patient has a collection of tokens based on their procedures and whatever</a:t>
             </a:r>
           </a:p>
           <a:p>
@@ -3751,7 +3949,7 @@
           <p:cNvPr id="2" name="Title 1">
             <a:extLst>
               <a:ext uri="{FF2B5EF4-FFF2-40B4-BE49-F238E27FC236}">
-                <a16:creationId xmlns:a16="http://schemas.microsoft.com/office/drawing/2014/main" id="{BF199643-FE98-4789-A3B6-967CB49C20D8}"/>
+                <a16:creationId xmlns:a16="http://schemas.microsoft.com/office/drawing/2014/main" id="{A502C955-D9B4-47F9-B1A0-791BB5A77C01}"/>
               </a:ext>
             </a:extLst>
           </p:cNvPr>
@@ -3769,7 +3967,7 @@
           <a:p>
             <a:r>
               <a:rPr lang="en-US" dirty="0"/>
-              <a:t>Friction Points</a:t>
+              <a:t>Main Users</a:t>
             </a:r>
           </a:p>
         </p:txBody>
@@ -3779,7 +3977,7 @@
           <p:cNvPr id="3" name="Content Placeholder 2">
             <a:extLst>
               <a:ext uri="{FF2B5EF4-FFF2-40B4-BE49-F238E27FC236}">
-                <a16:creationId xmlns:a16="http://schemas.microsoft.com/office/drawing/2014/main" id="{28FD262E-FB21-4AD8-B535-9A7EDB436D9F}"/>
+                <a16:creationId xmlns:a16="http://schemas.microsoft.com/office/drawing/2014/main" id="{B9344B85-5119-4B70-8156-C8479E04D794}"/>
               </a:ext>
             </a:extLst>
           </p:cNvPr>
@@ -3797,46 +3995,40 @@
           <a:p>
             <a:r>
               <a:rPr lang="en-US" dirty="0"/>
-              <a:t>Does the patient “own” the tokens? Is he the sole provider of access to those tokens and who can see them?</a:t>
+              <a:t>Hospital</a:t>
             </a:r>
           </a:p>
           <a:p>
             <a:pPr lvl="1"/>
             <a:r>
               <a:rPr lang="en-US" dirty="0"/>
-              <a:t>No. but neither does the hospital or the doctor</a:t>
+              <a:t>Doctor</a:t>
             </a:r>
           </a:p>
           <a:p>
             <a:pPr lvl="1"/>
             <a:r>
               <a:rPr lang="en-US" dirty="0"/>
-              <a:t>The token IDs have the attributes associated with them</a:t>
+              <a:t>Nurse</a:t>
             </a:r>
           </a:p>
           <a:p>
             <a:pPr lvl="1"/>
             <a:r>
               <a:rPr lang="en-US" dirty="0"/>
-              <a:t>The tokens are stored on the chain </a:t>
-            </a:r>
-          </a:p>
-          <a:p>
-            <a:pPr lvl="1"/>
+              <a:t>Billing</a:t>
+            </a:r>
+          </a:p>
+          <a:p>
             <a:r>
               <a:rPr lang="en-US" dirty="0"/>
-              <a:t>Anyone with access to the chain and permissions (we set in the contract), can view the attributes of the token</a:t>
-            </a:r>
-          </a:p>
-          <a:p>
-            <a:pPr lvl="1"/>
-            <a:r>
-              <a:rPr lang="en-US" dirty="0" err="1"/>
-              <a:t>Amiright</a:t>
-            </a:r>
+              <a:t>Insurance</a:t>
+            </a:r>
+          </a:p>
+          <a:p>
             <a:r>
               <a:rPr lang="en-US" dirty="0"/>
-              <a:t>? Need to look</a:t>
+              <a:t>Patient</a:t>
             </a:r>
           </a:p>
         </p:txBody>
@@ -3844,7 +4036,7 @@
     </p:spTree>
     <p:extLst>
       <p:ext uri="{BB962C8B-B14F-4D97-AF65-F5344CB8AC3E}">
-        <p14:creationId xmlns:p14="http://schemas.microsoft.com/office/powerpoint/2010/main" val="2146398915"/>
+        <p14:creationId xmlns:p14="http://schemas.microsoft.com/office/powerpoint/2010/main" val="1892453509"/>
       </p:ext>
     </p:extLst>
   </p:cSld>
@@ -3855,6 +4047,767 @@
 </file>
 
 <file path=ppt/slides/slide6.xml><?xml version="1.0" encoding="utf-8"?>
+<p:sld xmlns:a="http://schemas.openxmlformats.org/drawingml/2006/main" xmlns:r="http://schemas.openxmlformats.org/officeDocument/2006/relationships" xmlns:p="http://schemas.openxmlformats.org/presentationml/2006/main">
+  <p:cSld>
+    <p:bg>
+      <p:bgPr>
+        <a:gradFill flip="none" rotWithShape="1">
+          <a:gsLst>
+            <a:gs pos="31000">
+              <a:schemeClr val="accent1">
+                <a:lumMod val="40000"/>
+                <a:lumOff val="60000"/>
+              </a:schemeClr>
+            </a:gs>
+            <a:gs pos="12000">
+              <a:schemeClr val="accent1">
+                <a:lumMod val="5000"/>
+                <a:lumOff val="95000"/>
+              </a:schemeClr>
+            </a:gs>
+            <a:gs pos="52000">
+              <a:schemeClr val="accent1">
+                <a:lumMod val="60000"/>
+                <a:lumOff val="40000"/>
+              </a:schemeClr>
+            </a:gs>
+            <a:gs pos="70000">
+              <a:schemeClr val="accent1">
+                <a:lumMod val="75000"/>
+              </a:schemeClr>
+            </a:gs>
+            <a:gs pos="87000">
+              <a:schemeClr val="accent1">
+                <a:lumMod val="50000"/>
+              </a:schemeClr>
+            </a:gs>
+          </a:gsLst>
+          <a:lin ang="0" scaled="1"/>
+          <a:tileRect/>
+        </a:gradFill>
+        <a:effectLst/>
+      </p:bgPr>
+    </p:bg>
+    <p:spTree>
+      <p:nvGrpSpPr>
+        <p:cNvPr id="1" name=""/>
+        <p:cNvGrpSpPr/>
+        <p:nvPr/>
+      </p:nvGrpSpPr>
+      <p:grpSpPr>
+        <a:xfrm>
+          <a:off x="0" y="0"/>
+          <a:ext cx="0" cy="0"/>
+          <a:chOff x="0" y="0"/>
+          <a:chExt cx="0" cy="0"/>
+        </a:xfrm>
+      </p:grpSpPr>
+      <p:sp>
+        <p:nvSpPr>
+          <p:cNvPr id="2" name="Title 1">
+            <a:extLst>
+              <a:ext uri="{FF2B5EF4-FFF2-40B4-BE49-F238E27FC236}">
+                <a16:creationId xmlns:a16="http://schemas.microsoft.com/office/drawing/2014/main" id="{850BE05C-124E-4352-B449-517566224681}"/>
+              </a:ext>
+            </a:extLst>
+          </p:cNvPr>
+          <p:cNvSpPr>
+            <a:spLocks noGrp="1"/>
+          </p:cNvSpPr>
+          <p:nvPr>
+            <p:ph type="title"/>
+          </p:nvPr>
+        </p:nvSpPr>
+        <p:spPr>
+          <a:xfrm>
+            <a:off x="0" y="0"/>
+            <a:ext cx="10515600" cy="1325563"/>
+          </a:xfrm>
+        </p:spPr>
+        <p:txBody>
+          <a:bodyPr/>
+          <a:lstStyle/>
+          <a:p>
+            <a:r>
+              <a:rPr lang="en-US" dirty="0"/>
+              <a:t>General Workflow</a:t>
+            </a:r>
+          </a:p>
+        </p:txBody>
+      </p:sp>
+      <p:sp>
+        <p:nvSpPr>
+          <p:cNvPr id="4" name="Rectangle 3">
+            <a:extLst>
+              <a:ext uri="{FF2B5EF4-FFF2-40B4-BE49-F238E27FC236}">
+                <a16:creationId xmlns:a16="http://schemas.microsoft.com/office/drawing/2014/main" id="{C66A944D-DA79-40AE-A54B-3FA893B3E362}"/>
+              </a:ext>
+            </a:extLst>
+          </p:cNvPr>
+          <p:cNvSpPr/>
+          <p:nvPr/>
+        </p:nvSpPr>
+        <p:spPr>
+          <a:xfrm>
+            <a:off x="97174" y="1171284"/>
+            <a:ext cx="1711354" cy="1429303"/>
+          </a:xfrm>
+          <a:prstGeom prst="rect">
+            <a:avLst/>
+          </a:prstGeom>
+          <a:solidFill>
+            <a:schemeClr val="accent1">
+              <a:lumMod val="50000"/>
+            </a:schemeClr>
+          </a:solidFill>
+          <a:ln>
+            <a:noFill/>
+          </a:ln>
+        </p:spPr>
+        <p:style>
+          <a:lnRef idx="2">
+            <a:schemeClr val="accent1">
+              <a:shade val="50000"/>
+            </a:schemeClr>
+          </a:lnRef>
+          <a:fillRef idx="1">
+            <a:schemeClr val="accent1"/>
+          </a:fillRef>
+          <a:effectRef idx="0">
+            <a:schemeClr val="accent1"/>
+          </a:effectRef>
+          <a:fontRef idx="minor">
+            <a:schemeClr val="lt1"/>
+          </a:fontRef>
+        </p:style>
+        <p:txBody>
+          <a:bodyPr rtlCol="0" anchor="ctr"/>
+          <a:lstStyle/>
+          <a:p>
+            <a:pPr algn="ctr"/>
+            <a:r>
+              <a:rPr lang="en-US" dirty="0">
+                <a:solidFill>
+                  <a:schemeClr val="tx1"/>
+                </a:solidFill>
+              </a:rPr>
+              <a:t>New Patient Visit</a:t>
+            </a:r>
+          </a:p>
+        </p:txBody>
+      </p:sp>
+      <p:sp>
+        <p:nvSpPr>
+          <p:cNvPr id="5" name="Rectangle 4">
+            <a:extLst>
+              <a:ext uri="{FF2B5EF4-FFF2-40B4-BE49-F238E27FC236}">
+                <a16:creationId xmlns:a16="http://schemas.microsoft.com/office/drawing/2014/main" id="{C2B54199-9B9B-4146-A092-520ACD8BD05F}"/>
+              </a:ext>
+            </a:extLst>
+          </p:cNvPr>
+          <p:cNvSpPr/>
+          <p:nvPr/>
+        </p:nvSpPr>
+        <p:spPr>
+          <a:xfrm>
+            <a:off x="2102002" y="1936360"/>
+            <a:ext cx="1711354" cy="1429303"/>
+          </a:xfrm>
+          <a:prstGeom prst="rect">
+            <a:avLst/>
+          </a:prstGeom>
+          <a:solidFill>
+            <a:schemeClr val="accent1">
+              <a:lumMod val="75000"/>
+            </a:schemeClr>
+          </a:solidFill>
+          <a:ln>
+            <a:noFill/>
+          </a:ln>
+        </p:spPr>
+        <p:style>
+          <a:lnRef idx="2">
+            <a:schemeClr val="accent1">
+              <a:shade val="50000"/>
+            </a:schemeClr>
+          </a:lnRef>
+          <a:fillRef idx="1">
+            <a:schemeClr val="accent1"/>
+          </a:fillRef>
+          <a:effectRef idx="0">
+            <a:schemeClr val="accent1"/>
+          </a:effectRef>
+          <a:fontRef idx="minor">
+            <a:schemeClr val="lt1"/>
+          </a:fontRef>
+        </p:style>
+        <p:txBody>
+          <a:bodyPr rtlCol="0" anchor="ctr"/>
+          <a:lstStyle/>
+          <a:p>
+            <a:pPr algn="ctr"/>
+            <a:r>
+              <a:rPr lang="en-US" dirty="0">
+                <a:solidFill>
+                  <a:schemeClr val="tx1"/>
+                </a:solidFill>
+              </a:rPr>
+              <a:t>Patient gets a check-up</a:t>
+            </a:r>
+          </a:p>
+        </p:txBody>
+      </p:sp>
+      <p:sp>
+        <p:nvSpPr>
+          <p:cNvPr id="6" name="Rectangle 5">
+            <a:extLst>
+              <a:ext uri="{FF2B5EF4-FFF2-40B4-BE49-F238E27FC236}">
+                <a16:creationId xmlns:a16="http://schemas.microsoft.com/office/drawing/2014/main" id="{4C38F0AD-C797-4889-A29E-806F511E4C59}"/>
+              </a:ext>
+            </a:extLst>
+          </p:cNvPr>
+          <p:cNvSpPr/>
+          <p:nvPr/>
+        </p:nvSpPr>
+        <p:spPr>
+          <a:xfrm>
+            <a:off x="4106830" y="2701436"/>
+            <a:ext cx="1711354" cy="1429303"/>
+          </a:xfrm>
+          <a:prstGeom prst="rect">
+            <a:avLst/>
+          </a:prstGeom>
+          <a:solidFill>
+            <a:schemeClr val="accent1">
+              <a:lumMod val="60000"/>
+              <a:lumOff val="40000"/>
+            </a:schemeClr>
+          </a:solidFill>
+          <a:ln>
+            <a:noFill/>
+          </a:ln>
+        </p:spPr>
+        <p:style>
+          <a:lnRef idx="2">
+            <a:schemeClr val="accent1">
+              <a:shade val="50000"/>
+            </a:schemeClr>
+          </a:lnRef>
+          <a:fillRef idx="1">
+            <a:schemeClr val="accent1"/>
+          </a:fillRef>
+          <a:effectRef idx="0">
+            <a:schemeClr val="accent1"/>
+          </a:effectRef>
+          <a:fontRef idx="minor">
+            <a:schemeClr val="lt1"/>
+          </a:fontRef>
+        </p:style>
+        <p:txBody>
+          <a:bodyPr rtlCol="0" anchor="ctr"/>
+          <a:lstStyle/>
+          <a:p>
+            <a:pPr algn="ctr"/>
+            <a:r>
+              <a:rPr lang="en-US" dirty="0">
+                <a:solidFill>
+                  <a:schemeClr val="tx1"/>
+                </a:solidFill>
+              </a:rPr>
+              <a:t>Patient is diagnosed with something</a:t>
+            </a:r>
+          </a:p>
+        </p:txBody>
+      </p:sp>
+      <p:sp>
+        <p:nvSpPr>
+          <p:cNvPr id="7" name="Rectangle 6">
+            <a:extLst>
+              <a:ext uri="{FF2B5EF4-FFF2-40B4-BE49-F238E27FC236}">
+                <a16:creationId xmlns:a16="http://schemas.microsoft.com/office/drawing/2014/main" id="{1EF3BD04-7859-44C2-9E86-E8DCF131C1EB}"/>
+              </a:ext>
+            </a:extLst>
+          </p:cNvPr>
+          <p:cNvSpPr/>
+          <p:nvPr/>
+        </p:nvSpPr>
+        <p:spPr>
+          <a:xfrm>
+            <a:off x="6111658" y="3466512"/>
+            <a:ext cx="1711354" cy="1429303"/>
+          </a:xfrm>
+          <a:prstGeom prst="rect">
+            <a:avLst/>
+          </a:prstGeom>
+          <a:solidFill>
+            <a:schemeClr val="accent1">
+              <a:lumMod val="40000"/>
+              <a:lumOff val="60000"/>
+            </a:schemeClr>
+          </a:solidFill>
+          <a:ln>
+            <a:noFill/>
+          </a:ln>
+        </p:spPr>
+        <p:style>
+          <a:lnRef idx="2">
+            <a:schemeClr val="accent1">
+              <a:shade val="50000"/>
+            </a:schemeClr>
+          </a:lnRef>
+          <a:fillRef idx="1">
+            <a:schemeClr val="accent1"/>
+          </a:fillRef>
+          <a:effectRef idx="0">
+            <a:schemeClr val="accent1"/>
+          </a:effectRef>
+          <a:fontRef idx="minor">
+            <a:schemeClr val="lt1"/>
+          </a:fontRef>
+        </p:style>
+        <p:txBody>
+          <a:bodyPr rtlCol="0" anchor="ctr"/>
+          <a:lstStyle/>
+          <a:p>
+            <a:pPr algn="ctr"/>
+            <a:r>
+              <a:rPr lang="en-US" dirty="0">
+                <a:solidFill>
+                  <a:schemeClr val="tx1"/>
+                </a:solidFill>
+              </a:rPr>
+              <a:t>Patient gets surgery</a:t>
+            </a:r>
+          </a:p>
+        </p:txBody>
+      </p:sp>
+      <p:sp>
+        <p:nvSpPr>
+          <p:cNvPr id="8" name="Rectangle 7">
+            <a:extLst>
+              <a:ext uri="{FF2B5EF4-FFF2-40B4-BE49-F238E27FC236}">
+                <a16:creationId xmlns:a16="http://schemas.microsoft.com/office/drawing/2014/main" id="{65BB0D4E-E968-4010-9E77-2CC73C0D8B38}"/>
+              </a:ext>
+            </a:extLst>
+          </p:cNvPr>
+          <p:cNvSpPr/>
+          <p:nvPr/>
+        </p:nvSpPr>
+        <p:spPr>
+          <a:xfrm>
+            <a:off x="8116486" y="4231588"/>
+            <a:ext cx="1711354" cy="1429303"/>
+          </a:xfrm>
+          <a:prstGeom prst="rect">
+            <a:avLst/>
+          </a:prstGeom>
+          <a:solidFill>
+            <a:schemeClr val="accent1">
+              <a:lumMod val="20000"/>
+              <a:lumOff val="80000"/>
+            </a:schemeClr>
+          </a:solidFill>
+          <a:ln>
+            <a:noFill/>
+          </a:ln>
+        </p:spPr>
+        <p:style>
+          <a:lnRef idx="2">
+            <a:schemeClr val="accent1">
+              <a:shade val="50000"/>
+            </a:schemeClr>
+          </a:lnRef>
+          <a:fillRef idx="1">
+            <a:schemeClr val="accent1"/>
+          </a:fillRef>
+          <a:effectRef idx="0">
+            <a:schemeClr val="accent1"/>
+          </a:effectRef>
+          <a:fontRef idx="minor">
+            <a:schemeClr val="lt1"/>
+          </a:fontRef>
+        </p:style>
+        <p:txBody>
+          <a:bodyPr rtlCol="0" anchor="ctr"/>
+          <a:lstStyle/>
+          <a:p>
+            <a:pPr algn="ctr"/>
+            <a:r>
+              <a:rPr lang="en-US" dirty="0">
+                <a:solidFill>
+                  <a:schemeClr val="tx1"/>
+                </a:solidFill>
+              </a:rPr>
+              <a:t>Patient gets prescription</a:t>
+            </a:r>
+          </a:p>
+        </p:txBody>
+      </p:sp>
+      <p:sp>
+        <p:nvSpPr>
+          <p:cNvPr id="9" name="Rectangle 8">
+            <a:extLst>
+              <a:ext uri="{FF2B5EF4-FFF2-40B4-BE49-F238E27FC236}">
+                <a16:creationId xmlns:a16="http://schemas.microsoft.com/office/drawing/2014/main" id="{27776953-9640-4CCE-8230-334F0B9C2725}"/>
+              </a:ext>
+            </a:extLst>
+          </p:cNvPr>
+          <p:cNvSpPr/>
+          <p:nvPr/>
+        </p:nvSpPr>
+        <p:spPr>
+          <a:xfrm>
+            <a:off x="10121315" y="4996663"/>
+            <a:ext cx="1711354" cy="1429303"/>
+          </a:xfrm>
+          <a:prstGeom prst="rect">
+            <a:avLst/>
+          </a:prstGeom>
+          <a:solidFill>
+            <a:schemeClr val="bg1">
+              <a:lumMod val="95000"/>
+            </a:schemeClr>
+          </a:solidFill>
+          <a:ln>
+            <a:noFill/>
+          </a:ln>
+        </p:spPr>
+        <p:style>
+          <a:lnRef idx="2">
+            <a:schemeClr val="accent1">
+              <a:shade val="50000"/>
+            </a:schemeClr>
+          </a:lnRef>
+          <a:fillRef idx="1">
+            <a:schemeClr val="accent1"/>
+          </a:fillRef>
+          <a:effectRef idx="0">
+            <a:schemeClr val="accent1"/>
+          </a:effectRef>
+          <a:fontRef idx="minor">
+            <a:schemeClr val="lt1"/>
+          </a:fontRef>
+        </p:style>
+        <p:txBody>
+          <a:bodyPr rtlCol="0" anchor="ctr"/>
+          <a:lstStyle/>
+          <a:p>
+            <a:pPr algn="ctr"/>
+            <a:r>
+              <a:rPr lang="en-US" dirty="0">
+                <a:solidFill>
+                  <a:schemeClr val="tx1"/>
+                </a:solidFill>
+              </a:rPr>
+              <a:t>Patient goes to new hospital</a:t>
+            </a:r>
+          </a:p>
+        </p:txBody>
+      </p:sp>
+      <p:sp>
+        <p:nvSpPr>
+          <p:cNvPr id="10" name="Arrow: Bent 9">
+            <a:extLst>
+              <a:ext uri="{FF2B5EF4-FFF2-40B4-BE49-F238E27FC236}">
+                <a16:creationId xmlns:a16="http://schemas.microsoft.com/office/drawing/2014/main" id="{7D73C482-C7EB-4805-AB4D-A63C8C469A86}"/>
+              </a:ext>
+            </a:extLst>
+          </p:cNvPr>
+          <p:cNvSpPr/>
+          <p:nvPr/>
+        </p:nvSpPr>
+        <p:spPr>
+          <a:xfrm flipV="1">
+            <a:off x="700551" y="2687832"/>
+            <a:ext cx="1254714" cy="677831"/>
+          </a:xfrm>
+          <a:prstGeom prst="bentArrow">
+            <a:avLst/>
+          </a:prstGeom>
+          <a:solidFill>
+            <a:schemeClr val="tx1"/>
+          </a:solidFill>
+          <a:ln>
+            <a:solidFill>
+              <a:schemeClr val="bg1"/>
+            </a:solidFill>
+          </a:ln>
+        </p:spPr>
+        <p:style>
+          <a:lnRef idx="2">
+            <a:schemeClr val="accent1">
+              <a:shade val="50000"/>
+            </a:schemeClr>
+          </a:lnRef>
+          <a:fillRef idx="1">
+            <a:schemeClr val="accent1"/>
+          </a:fillRef>
+          <a:effectRef idx="0">
+            <a:schemeClr val="accent1"/>
+          </a:effectRef>
+          <a:fontRef idx="minor">
+            <a:schemeClr val="lt1"/>
+          </a:fontRef>
+        </p:style>
+        <p:txBody>
+          <a:bodyPr rtlCol="0" anchor="ctr"/>
+          <a:lstStyle/>
+          <a:p>
+            <a:pPr algn="ctr"/>
+            <a:endParaRPr lang="en-US">
+              <a:solidFill>
+                <a:schemeClr val="tx1"/>
+              </a:solidFill>
+            </a:endParaRPr>
+          </a:p>
+        </p:txBody>
+      </p:sp>
+      <p:sp>
+        <p:nvSpPr>
+          <p:cNvPr id="11" name="Arrow: Bent 10">
+            <a:extLst>
+              <a:ext uri="{FF2B5EF4-FFF2-40B4-BE49-F238E27FC236}">
+                <a16:creationId xmlns:a16="http://schemas.microsoft.com/office/drawing/2014/main" id="{5EC311DB-3B57-4F66-8572-912D415006A1}"/>
+              </a:ext>
+            </a:extLst>
+          </p:cNvPr>
+          <p:cNvSpPr/>
+          <p:nvPr/>
+        </p:nvSpPr>
+        <p:spPr>
+          <a:xfrm flipV="1">
+            <a:off x="4710207" y="4225058"/>
+            <a:ext cx="1254714" cy="677831"/>
+          </a:xfrm>
+          <a:prstGeom prst="bentArrow">
+            <a:avLst/>
+          </a:prstGeom>
+          <a:solidFill>
+            <a:schemeClr val="tx1"/>
+          </a:solidFill>
+          <a:ln>
+            <a:solidFill>
+              <a:schemeClr val="bg1"/>
+            </a:solidFill>
+          </a:ln>
+        </p:spPr>
+        <p:style>
+          <a:lnRef idx="2">
+            <a:schemeClr val="accent1">
+              <a:shade val="50000"/>
+            </a:schemeClr>
+          </a:lnRef>
+          <a:fillRef idx="1">
+            <a:schemeClr val="accent1"/>
+          </a:fillRef>
+          <a:effectRef idx="0">
+            <a:schemeClr val="accent1"/>
+          </a:effectRef>
+          <a:fontRef idx="minor">
+            <a:schemeClr val="lt1"/>
+          </a:fontRef>
+        </p:style>
+        <p:txBody>
+          <a:bodyPr rtlCol="0" anchor="ctr"/>
+          <a:lstStyle/>
+          <a:p>
+            <a:pPr algn="ctr"/>
+            <a:endParaRPr lang="en-US">
+              <a:solidFill>
+                <a:schemeClr val="tx1"/>
+              </a:solidFill>
+            </a:endParaRPr>
+          </a:p>
+        </p:txBody>
+      </p:sp>
+      <p:sp>
+        <p:nvSpPr>
+          <p:cNvPr id="12" name="Arrow: Bent 11">
+            <a:extLst>
+              <a:ext uri="{FF2B5EF4-FFF2-40B4-BE49-F238E27FC236}">
+                <a16:creationId xmlns:a16="http://schemas.microsoft.com/office/drawing/2014/main" id="{2A004022-C53F-4791-9495-A7FB21065DAD}"/>
+              </a:ext>
+            </a:extLst>
+          </p:cNvPr>
+          <p:cNvSpPr/>
+          <p:nvPr/>
+        </p:nvSpPr>
+        <p:spPr>
+          <a:xfrm flipV="1">
+            <a:off x="8719864" y="5748135"/>
+            <a:ext cx="1254714" cy="677831"/>
+          </a:xfrm>
+          <a:prstGeom prst="bentArrow">
+            <a:avLst/>
+          </a:prstGeom>
+          <a:solidFill>
+            <a:schemeClr val="tx1"/>
+          </a:solidFill>
+          <a:ln>
+            <a:solidFill>
+              <a:schemeClr val="bg1"/>
+            </a:solidFill>
+          </a:ln>
+        </p:spPr>
+        <p:style>
+          <a:lnRef idx="2">
+            <a:schemeClr val="accent1">
+              <a:shade val="50000"/>
+            </a:schemeClr>
+          </a:lnRef>
+          <a:fillRef idx="1">
+            <a:schemeClr val="accent1"/>
+          </a:fillRef>
+          <a:effectRef idx="0">
+            <a:schemeClr val="accent1"/>
+          </a:effectRef>
+          <a:fontRef idx="minor">
+            <a:schemeClr val="lt1"/>
+          </a:fontRef>
+        </p:style>
+        <p:txBody>
+          <a:bodyPr rtlCol="0" anchor="ctr"/>
+          <a:lstStyle/>
+          <a:p>
+            <a:pPr algn="ctr"/>
+            <a:endParaRPr lang="en-US">
+              <a:solidFill>
+                <a:schemeClr val="tx1"/>
+              </a:solidFill>
+            </a:endParaRPr>
+          </a:p>
+        </p:txBody>
+      </p:sp>
+      <p:sp>
+        <p:nvSpPr>
+          <p:cNvPr id="14" name="Arrow: Bent 13">
+            <a:extLst>
+              <a:ext uri="{FF2B5EF4-FFF2-40B4-BE49-F238E27FC236}">
+                <a16:creationId xmlns:a16="http://schemas.microsoft.com/office/drawing/2014/main" id="{7857EE6B-F8DD-4DEB-81AA-37A78CBB1B70}"/>
+              </a:ext>
+            </a:extLst>
+          </p:cNvPr>
+          <p:cNvSpPr/>
+          <p:nvPr/>
+        </p:nvSpPr>
+        <p:spPr>
+          <a:xfrm rot="5400000">
+            <a:off x="4206350" y="1683425"/>
+            <a:ext cx="670756" cy="1254713"/>
+          </a:xfrm>
+          <a:prstGeom prst="bentArrow">
+            <a:avLst/>
+          </a:prstGeom>
+          <a:solidFill>
+            <a:schemeClr val="tx1"/>
+          </a:solidFill>
+          <a:ln>
+            <a:solidFill>
+              <a:schemeClr val="bg1"/>
+            </a:solidFill>
+          </a:ln>
+        </p:spPr>
+        <p:style>
+          <a:lnRef idx="2">
+            <a:schemeClr val="accent1">
+              <a:shade val="50000"/>
+            </a:schemeClr>
+          </a:lnRef>
+          <a:fillRef idx="1">
+            <a:schemeClr val="accent1"/>
+          </a:fillRef>
+          <a:effectRef idx="0">
+            <a:schemeClr val="accent1"/>
+          </a:effectRef>
+          <a:fontRef idx="minor">
+            <a:schemeClr val="lt1"/>
+          </a:fontRef>
+        </p:style>
+        <p:txBody>
+          <a:bodyPr rtlCol="0" anchor="ctr"/>
+          <a:lstStyle/>
+          <a:p>
+            <a:pPr algn="ctr"/>
+            <a:endParaRPr lang="en-US">
+              <a:solidFill>
+                <a:schemeClr val="tx1"/>
+              </a:solidFill>
+            </a:endParaRPr>
+          </a:p>
+        </p:txBody>
+      </p:sp>
+      <p:sp>
+        <p:nvSpPr>
+          <p:cNvPr id="15" name="Arrow: Bent 14">
+            <a:extLst>
+              <a:ext uri="{FF2B5EF4-FFF2-40B4-BE49-F238E27FC236}">
+                <a16:creationId xmlns:a16="http://schemas.microsoft.com/office/drawing/2014/main" id="{7BE6D9F2-343A-4181-AA0E-C583C7262B15}"/>
+              </a:ext>
+            </a:extLst>
+          </p:cNvPr>
+          <p:cNvSpPr/>
+          <p:nvPr/>
+        </p:nvSpPr>
+        <p:spPr>
+          <a:xfrm rot="5400000">
+            <a:off x="8261728" y="3168005"/>
+            <a:ext cx="670756" cy="1254713"/>
+          </a:xfrm>
+          <a:prstGeom prst="bentArrow">
+            <a:avLst/>
+          </a:prstGeom>
+          <a:solidFill>
+            <a:schemeClr val="tx1"/>
+          </a:solidFill>
+          <a:ln>
+            <a:solidFill>
+              <a:schemeClr val="bg1"/>
+            </a:solidFill>
+          </a:ln>
+        </p:spPr>
+        <p:style>
+          <a:lnRef idx="2">
+            <a:schemeClr val="accent1">
+              <a:shade val="50000"/>
+            </a:schemeClr>
+          </a:lnRef>
+          <a:fillRef idx="1">
+            <a:schemeClr val="accent1"/>
+          </a:fillRef>
+          <a:effectRef idx="0">
+            <a:schemeClr val="accent1"/>
+          </a:effectRef>
+          <a:fontRef idx="minor">
+            <a:schemeClr val="lt1"/>
+          </a:fontRef>
+        </p:style>
+        <p:txBody>
+          <a:bodyPr rtlCol="0" anchor="ctr"/>
+          <a:lstStyle/>
+          <a:p>
+            <a:pPr algn="ctr"/>
+            <a:endParaRPr lang="en-US">
+              <a:solidFill>
+                <a:schemeClr val="tx1"/>
+              </a:solidFill>
+            </a:endParaRPr>
+          </a:p>
+        </p:txBody>
+      </p:sp>
+    </p:spTree>
+    <p:extLst>
+      <p:ext uri="{BB962C8B-B14F-4D97-AF65-F5344CB8AC3E}">
+        <p14:creationId xmlns:p14="http://schemas.microsoft.com/office/powerpoint/2010/main" val="3899092562"/>
+      </p:ext>
+    </p:extLst>
+  </p:cSld>
+  <p:clrMapOvr>
+    <a:masterClrMapping/>
+  </p:clrMapOvr>
+</p:sld>
+</file>
+
+<file path=ppt/slides/slide7.xml><?xml version="1.0" encoding="utf-8"?>
 <p:sld xmlns:a="http://schemas.openxmlformats.org/drawingml/2006/main" xmlns:r="http://schemas.openxmlformats.org/officeDocument/2006/relationships" xmlns:p="http://schemas.openxmlformats.org/presentationml/2006/main">
   <p:cSld>
     <p:spTree>
@@ -3876,7 +4829,7 @@
           <p:cNvPr id="2" name="Title 1">
             <a:extLst>
               <a:ext uri="{FF2B5EF4-FFF2-40B4-BE49-F238E27FC236}">
-                <a16:creationId xmlns:a16="http://schemas.microsoft.com/office/drawing/2014/main" id="{350D1BA4-1331-455B-A254-C25113A03A4F}"/>
+                <a16:creationId xmlns:a16="http://schemas.microsoft.com/office/drawing/2014/main" id="{7827AE61-515A-4AD4-8AB5-D9B6ED837CA1}"/>
               </a:ext>
             </a:extLst>
           </p:cNvPr>
@@ -3887,53 +4840,488 @@
             <p:ph type="title"/>
           </p:nvPr>
         </p:nvSpPr>
+        <p:spPr>
+          <a:xfrm>
+            <a:off x="16079" y="18255"/>
+            <a:ext cx="5718974" cy="1325563"/>
+          </a:xfrm>
+        </p:spPr>
+        <p:txBody>
+          <a:bodyPr>
+            <a:normAutofit/>
+          </a:bodyPr>
+          <a:lstStyle/>
+          <a:p>
+            <a:r>
+              <a:rPr lang="en-US" sz="3600" dirty="0"/>
+              <a:t>From </a:t>
+            </a:r>
+            <a:r>
+              <a:rPr lang="en-US" sz="3600" dirty="0" err="1"/>
+              <a:t>medicalchain</a:t>
+            </a:r>
+            <a:r>
+              <a:rPr lang="en-US" sz="3600" dirty="0"/>
+              <a:t> whitepaper</a:t>
+            </a:r>
+          </a:p>
+        </p:txBody>
+      </p:sp>
+      <p:sp>
+        <p:nvSpPr>
+          <p:cNvPr id="3" name="Content Placeholder 2">
+            <a:extLst>
+              <a:ext uri="{FF2B5EF4-FFF2-40B4-BE49-F238E27FC236}">
+                <a16:creationId xmlns:a16="http://schemas.microsoft.com/office/drawing/2014/main" id="{64C8C530-9D1D-4C49-8DF1-F6FEC4ECFAD3}"/>
+              </a:ext>
+            </a:extLst>
+          </p:cNvPr>
+          <p:cNvSpPr>
+            <a:spLocks noGrp="1"/>
+          </p:cNvSpPr>
+          <p:nvPr>
+            <p:ph idx="1"/>
+          </p:nvPr>
+        </p:nvSpPr>
         <p:spPr/>
         <p:txBody>
           <a:bodyPr/>
           <a:lstStyle/>
           <a:p>
-            <a:r>
-              <a:rPr lang="en-US" dirty="0"/>
-              <a:t>Resources</a:t>
-            </a:r>
-          </a:p>
-        </p:txBody>
-      </p:sp>
-      <p:sp>
-        <p:nvSpPr>
-          <p:cNvPr id="3" name="Content Placeholder 2">
-            <a:extLst>
-              <a:ext uri="{FF2B5EF4-FFF2-40B4-BE49-F238E27FC236}">
-                <a16:creationId xmlns:a16="http://schemas.microsoft.com/office/drawing/2014/main" id="{A9C6D207-A76F-4340-BFAB-9D581380C0A6}"/>
-              </a:ext>
-            </a:extLst>
-          </p:cNvPr>
-          <p:cNvSpPr>
-            <a:spLocks noGrp="1"/>
-          </p:cNvSpPr>
-          <p:nvPr>
-            <p:ph idx="1"/>
-          </p:nvPr>
-        </p:nvSpPr>
-        <p:spPr/>
-        <p:txBody>
-          <a:bodyPr/>
-          <a:lstStyle/>
-          <a:p>
-            <a:r>
-              <a:rPr lang="en-US" dirty="0">
-                <a:hlinkClick r:id="rId2"/>
-              </a:rPr>
-              <a:t>https://medicalchain.com/Medicalchain-Whitepaper-EN.pdf</a:t>
-            </a:r>
-            <a:endParaRPr lang="en-US" dirty="0"/>
-          </a:p>
-        </p:txBody>
-      </p:sp>
+            <a:endParaRPr lang="en-US"/>
+          </a:p>
+        </p:txBody>
+      </p:sp>
+      <p:pic>
+        <p:nvPicPr>
+          <p:cNvPr id="4" name="Picture 3">
+            <a:extLst>
+              <a:ext uri="{FF2B5EF4-FFF2-40B4-BE49-F238E27FC236}">
+                <a16:creationId xmlns:a16="http://schemas.microsoft.com/office/drawing/2014/main" id="{DEB90DCD-7CAA-49CB-93FB-892B90D4136B}"/>
+              </a:ext>
+            </a:extLst>
+          </p:cNvPr>
+          <p:cNvPicPr>
+            <a:picLocks noChangeAspect="1"/>
+          </p:cNvPicPr>
+          <p:nvPr/>
+        </p:nvPicPr>
+        <p:blipFill>
+          <a:blip r:embed="rId2"/>
+          <a:stretch>
+            <a:fillRect/>
+          </a:stretch>
+        </p:blipFill>
+        <p:spPr>
+          <a:xfrm>
+            <a:off x="5735053" y="0"/>
+            <a:ext cx="6456947" cy="6858000"/>
+          </a:xfrm>
+          <a:prstGeom prst="rect">
+            <a:avLst/>
+          </a:prstGeom>
+        </p:spPr>
+      </p:pic>
     </p:spTree>
     <p:extLst>
       <p:ext uri="{BB962C8B-B14F-4D97-AF65-F5344CB8AC3E}">
-        <p14:creationId xmlns:p14="http://schemas.microsoft.com/office/powerpoint/2010/main" val="538036556"/>
+        <p14:creationId xmlns:p14="http://schemas.microsoft.com/office/powerpoint/2010/main" val="3750418497"/>
+      </p:ext>
+    </p:extLst>
+  </p:cSld>
+  <p:clrMapOvr>
+    <a:masterClrMapping/>
+  </p:clrMapOvr>
+</p:sld>
+</file>
+
+<file path=ppt/slides/slide8.xml><?xml version="1.0" encoding="utf-8"?>
+<p:sld xmlns:a="http://schemas.openxmlformats.org/drawingml/2006/main" xmlns:r="http://schemas.openxmlformats.org/officeDocument/2006/relationships" xmlns:p="http://schemas.openxmlformats.org/presentationml/2006/main">
+  <p:cSld>
+    <p:spTree>
+      <p:nvGrpSpPr>
+        <p:cNvPr id="1" name=""/>
+        <p:cNvGrpSpPr/>
+        <p:nvPr/>
+      </p:nvGrpSpPr>
+      <p:grpSpPr>
+        <a:xfrm>
+          <a:off x="0" y="0"/>
+          <a:ext cx="0" cy="0"/>
+          <a:chOff x="0" y="0"/>
+          <a:chExt cx="0" cy="0"/>
+        </a:xfrm>
+      </p:grpSpPr>
+      <p:sp>
+        <p:nvSpPr>
+          <p:cNvPr id="2" name="Title 1">
+            <a:extLst>
+              <a:ext uri="{FF2B5EF4-FFF2-40B4-BE49-F238E27FC236}">
+                <a16:creationId xmlns:a16="http://schemas.microsoft.com/office/drawing/2014/main" id="{850BE05C-124E-4352-B449-517566224681}"/>
+              </a:ext>
+            </a:extLst>
+          </p:cNvPr>
+          <p:cNvSpPr>
+            <a:spLocks noGrp="1"/>
+          </p:cNvSpPr>
+          <p:nvPr>
+            <p:ph type="title"/>
+          </p:nvPr>
+        </p:nvSpPr>
+        <p:spPr>
+          <a:xfrm>
+            <a:off x="0" y="0"/>
+            <a:ext cx="10515600" cy="1325563"/>
+          </a:xfrm>
+        </p:spPr>
+        <p:txBody>
+          <a:bodyPr/>
+          <a:lstStyle/>
+          <a:p>
+            <a:r>
+              <a:rPr lang="en-US" dirty="0"/>
+              <a:t>New Patient Visit (code idea)</a:t>
+            </a:r>
+          </a:p>
+        </p:txBody>
+      </p:sp>
+      <p:sp>
+        <p:nvSpPr>
+          <p:cNvPr id="3" name="Rectangle 2">
+            <a:extLst>
+              <a:ext uri="{FF2B5EF4-FFF2-40B4-BE49-F238E27FC236}">
+                <a16:creationId xmlns:a16="http://schemas.microsoft.com/office/drawing/2014/main" id="{BD8155A6-6388-4CF7-A7D0-1E77E80250CA}"/>
+              </a:ext>
+            </a:extLst>
+          </p:cNvPr>
+          <p:cNvSpPr/>
+          <p:nvPr/>
+        </p:nvSpPr>
+        <p:spPr>
+          <a:xfrm>
+            <a:off x="142613" y="1325563"/>
+            <a:ext cx="11853644" cy="4831956"/>
+          </a:xfrm>
+          <a:prstGeom prst="rect">
+            <a:avLst/>
+          </a:prstGeom>
+        </p:spPr>
+        <p:style>
+          <a:lnRef idx="2">
+            <a:schemeClr val="accent1">
+              <a:shade val="50000"/>
+            </a:schemeClr>
+          </a:lnRef>
+          <a:fillRef idx="1">
+            <a:schemeClr val="accent1"/>
+          </a:fillRef>
+          <a:effectRef idx="0">
+            <a:schemeClr val="accent1"/>
+          </a:effectRef>
+          <a:fontRef idx="minor">
+            <a:schemeClr val="lt1"/>
+          </a:fontRef>
+        </p:style>
+        <p:txBody>
+          <a:bodyPr rtlCol="0" anchor="ctr"/>
+          <a:lstStyle/>
+          <a:p>
+            <a:r>
+              <a:rPr lang="en-US" sz="1600" dirty="0"/>
+              <a:t>pragma solidity ^0.5.0;</a:t>
+            </a:r>
+          </a:p>
+          <a:p>
+            <a:r>
+              <a:rPr lang="en-US" sz="1600" dirty="0"/>
+              <a:t>import "https://github.com/</a:t>
+            </a:r>
+            <a:r>
+              <a:rPr lang="en-US" sz="1600" dirty="0" err="1"/>
+              <a:t>OpenZeppelin</a:t>
+            </a:r>
+            <a:r>
+              <a:rPr lang="en-US" sz="1600" dirty="0"/>
+              <a:t>/</a:t>
+            </a:r>
+            <a:r>
+              <a:rPr lang="en-US" sz="1600" dirty="0" err="1"/>
+              <a:t>openzeppelin</a:t>
+            </a:r>
+            <a:r>
+              <a:rPr lang="en-US" sz="1600" dirty="0"/>
+              <a:t>-contracts/blob/release-v2.5.0/contracts/token/ERC20/ERC20.sol";</a:t>
+            </a:r>
+          </a:p>
+          <a:p>
+            <a:r>
+              <a:rPr lang="en-US" sz="1600" dirty="0"/>
+              <a:t>import "https://github.com/</a:t>
+            </a:r>
+            <a:r>
+              <a:rPr lang="en-US" sz="1600" dirty="0" err="1"/>
+              <a:t>OpenZeppelin</a:t>
+            </a:r>
+            <a:r>
+              <a:rPr lang="en-US" sz="1600" dirty="0"/>
+              <a:t>/</a:t>
+            </a:r>
+            <a:r>
+              <a:rPr lang="en-US" sz="1600" dirty="0" err="1"/>
+              <a:t>openzeppelin</a:t>
+            </a:r>
+            <a:r>
+              <a:rPr lang="en-US" sz="1600" dirty="0"/>
+              <a:t>-contracts/blob/release-v2.5.0/contracts/token/ERC20/ERC20Detailed.sol";</a:t>
+            </a:r>
+          </a:p>
+          <a:p>
+            <a:r>
+              <a:rPr lang="en-US" sz="1600" dirty="0"/>
+              <a:t>import "https://github.com/</a:t>
+            </a:r>
+            <a:r>
+              <a:rPr lang="en-US" sz="1600" dirty="0" err="1"/>
+              <a:t>OpenZeppelin</a:t>
+            </a:r>
+            <a:r>
+              <a:rPr lang="en-US" sz="1600" dirty="0"/>
+              <a:t>/</a:t>
+            </a:r>
+            <a:r>
+              <a:rPr lang="en-US" sz="1600" dirty="0" err="1"/>
+              <a:t>openzeppelin</a:t>
+            </a:r>
+            <a:r>
+              <a:rPr lang="en-US" sz="1600" dirty="0"/>
+              <a:t>-contracts/blob/release-v2.5.0/contracts/token/ERC20/ERC20Mintable.sol";</a:t>
+            </a:r>
+          </a:p>
+          <a:p>
+            <a:r>
+              <a:rPr lang="en-US" sz="1600" dirty="0"/>
+              <a:t>contract </a:t>
+            </a:r>
+            <a:r>
+              <a:rPr lang="en-US" sz="1600" dirty="0" err="1"/>
+              <a:t>ArcadeToken</a:t>
+            </a:r>
+            <a:r>
+              <a:rPr lang="en-US" sz="1600" dirty="0"/>
+              <a:t> is ERC20, ERC20Detailed, ERC20Mintable {    </a:t>
+            </a:r>
+          </a:p>
+          <a:p>
+            <a:r>
+              <a:rPr lang="en-US" sz="1600" dirty="0"/>
+              <a:t>	constructor (        	string memory name,        </a:t>
+            </a:r>
+          </a:p>
+          <a:p>
+            <a:r>
+              <a:rPr lang="en-US" sz="1600" dirty="0"/>
+              <a:t>			string memory symbol,        </a:t>
+            </a:r>
+          </a:p>
+          <a:p>
+            <a:r>
+              <a:rPr lang="en-US" sz="1600" dirty="0"/>
+              <a:t>			</a:t>
+            </a:r>
+            <a:r>
+              <a:rPr lang="en-US" sz="1600" dirty="0" err="1"/>
+              <a:t>uint</a:t>
+            </a:r>
+            <a:r>
+              <a:rPr lang="en-US" sz="1600" dirty="0"/>
+              <a:t> </a:t>
+            </a:r>
+            <a:r>
+              <a:rPr lang="en-US" sz="1600" dirty="0" err="1"/>
+              <a:t>initial_supply</a:t>
+            </a:r>
+            <a:r>
+              <a:rPr lang="en-US" sz="1600" dirty="0"/>
+              <a:t>        </a:t>
+            </a:r>
+          </a:p>
+          <a:p>
+            <a:r>
+              <a:rPr lang="en-US" sz="1600" dirty="0"/>
+              <a:t>			)        </a:t>
+            </a:r>
+          </a:p>
+          <a:p>
+            <a:r>
+              <a:rPr lang="en-US" sz="1600" dirty="0"/>
+              <a:t>	ERC20Detailed(name,symbol,18)        public {           </a:t>
+            </a:r>
+          </a:p>
+          <a:p>
+            <a:r>
+              <a:rPr lang="en-US" sz="1600" dirty="0"/>
+              <a:t>		 mint(</a:t>
+            </a:r>
+            <a:r>
+              <a:rPr lang="en-US" sz="1600" dirty="0" err="1"/>
+              <a:t>msg.sender</a:t>
+            </a:r>
+            <a:r>
+              <a:rPr lang="en-US" sz="1600" dirty="0"/>
+              <a:t>, </a:t>
+            </a:r>
+            <a:r>
+              <a:rPr lang="en-US" sz="1600" dirty="0" err="1"/>
+              <a:t>initial_supply</a:t>
+            </a:r>
+            <a:r>
+              <a:rPr lang="en-US" sz="1600" dirty="0"/>
+              <a:t>);        </a:t>
+            </a:r>
+          </a:p>
+          <a:p>
+            <a:r>
+              <a:rPr lang="en-US" sz="1600" dirty="0"/>
+              <a:t>	}                </a:t>
+            </a:r>
+          </a:p>
+          <a:p>
+            <a:r>
+              <a:rPr lang="en-US" sz="1600" dirty="0"/>
+              <a:t>}</a:t>
+            </a:r>
+          </a:p>
+        </p:txBody>
+      </p:sp>
+    </p:spTree>
+    <p:extLst>
+      <p:ext uri="{BB962C8B-B14F-4D97-AF65-F5344CB8AC3E}">
+        <p14:creationId xmlns:p14="http://schemas.microsoft.com/office/powerpoint/2010/main" val="2286602086"/>
+      </p:ext>
+    </p:extLst>
+  </p:cSld>
+  <p:clrMapOvr>
+    <a:masterClrMapping/>
+  </p:clrMapOvr>
+</p:sld>
+</file>
+
+<file path=ppt/slides/slide9.xml><?xml version="1.0" encoding="utf-8"?>
+<p:sld xmlns:a="http://schemas.openxmlformats.org/drawingml/2006/main" xmlns:r="http://schemas.openxmlformats.org/officeDocument/2006/relationships" xmlns:p="http://schemas.openxmlformats.org/presentationml/2006/main">
+  <p:cSld>
+    <p:spTree>
+      <p:nvGrpSpPr>
+        <p:cNvPr id="1" name=""/>
+        <p:cNvGrpSpPr/>
+        <p:nvPr/>
+      </p:nvGrpSpPr>
+      <p:grpSpPr>
+        <a:xfrm>
+          <a:off x="0" y="0"/>
+          <a:ext cx="0" cy="0"/>
+          <a:chOff x="0" y="0"/>
+          <a:chExt cx="0" cy="0"/>
+        </a:xfrm>
+      </p:grpSpPr>
+      <p:sp>
+        <p:nvSpPr>
+          <p:cNvPr id="2" name="Title 1">
+            <a:extLst>
+              <a:ext uri="{FF2B5EF4-FFF2-40B4-BE49-F238E27FC236}">
+                <a16:creationId xmlns:a16="http://schemas.microsoft.com/office/drawing/2014/main" id="{BF199643-FE98-4789-A3B6-967CB49C20D8}"/>
+              </a:ext>
+            </a:extLst>
+          </p:cNvPr>
+          <p:cNvSpPr>
+            <a:spLocks noGrp="1"/>
+          </p:cNvSpPr>
+          <p:nvPr>
+            <p:ph type="title"/>
+          </p:nvPr>
+        </p:nvSpPr>
+        <p:spPr/>
+        <p:txBody>
+          <a:bodyPr/>
+          <a:lstStyle/>
+          <a:p>
+            <a:r>
+              <a:rPr lang="en-US" dirty="0"/>
+              <a:t>Friction Points</a:t>
+            </a:r>
+          </a:p>
+        </p:txBody>
+      </p:sp>
+      <p:sp>
+        <p:nvSpPr>
+          <p:cNvPr id="3" name="Content Placeholder 2">
+            <a:extLst>
+              <a:ext uri="{FF2B5EF4-FFF2-40B4-BE49-F238E27FC236}">
+                <a16:creationId xmlns:a16="http://schemas.microsoft.com/office/drawing/2014/main" id="{28FD262E-FB21-4AD8-B535-9A7EDB436D9F}"/>
+              </a:ext>
+            </a:extLst>
+          </p:cNvPr>
+          <p:cNvSpPr>
+            <a:spLocks noGrp="1"/>
+          </p:cNvSpPr>
+          <p:nvPr>
+            <p:ph idx="1"/>
+          </p:nvPr>
+        </p:nvSpPr>
+        <p:spPr/>
+        <p:txBody>
+          <a:bodyPr/>
+          <a:lstStyle/>
+          <a:p>
+            <a:r>
+              <a:rPr lang="en-US" dirty="0"/>
+              <a:t>Does the patient “own” the tokens? Is he the sole provider of access to those tokens and who can see them?</a:t>
+            </a:r>
+          </a:p>
+          <a:p>
+            <a:pPr lvl="1"/>
+            <a:r>
+              <a:rPr lang="en-US" dirty="0"/>
+              <a:t>No. but neither does the hospital or the doctor</a:t>
+            </a:r>
+          </a:p>
+          <a:p>
+            <a:pPr lvl="1"/>
+            <a:r>
+              <a:rPr lang="en-US" dirty="0"/>
+              <a:t>The token IDs have the attributes associated with them</a:t>
+            </a:r>
+          </a:p>
+          <a:p>
+            <a:pPr lvl="1"/>
+            <a:r>
+              <a:rPr lang="en-US" dirty="0"/>
+              <a:t>The tokens are stored on the chain </a:t>
+            </a:r>
+          </a:p>
+          <a:p>
+            <a:pPr lvl="1"/>
+            <a:r>
+              <a:rPr lang="en-US" dirty="0"/>
+              <a:t>Anyone with access to the chain and permissions (we set in the contract), can view the attributes of the token</a:t>
+            </a:r>
+          </a:p>
+          <a:p>
+            <a:pPr lvl="1"/>
+            <a:r>
+              <a:rPr lang="en-US" dirty="0" err="1"/>
+              <a:t>Amiright</a:t>
+            </a:r>
+            <a:r>
+              <a:rPr lang="en-US" dirty="0"/>
+              <a:t>? Need to look</a:t>
+            </a:r>
+          </a:p>
+        </p:txBody>
+      </p:sp>
+    </p:spTree>
+    <p:extLst>
+      <p:ext uri="{BB962C8B-B14F-4D97-AF65-F5344CB8AC3E}">
+        <p14:creationId xmlns:p14="http://schemas.microsoft.com/office/powerpoint/2010/main" val="2146398915"/>
       </p:ext>
     </p:extLst>
   </p:cSld>

</xml_diff>